<commit_message>
Finish first SD/UMD calib presentation
</commit_message>
<xml_diff>
--- a/Presentations/sd_calibration/material/sd_calib_2023_10_30/sd_calib_2023_10_30_filip.pptx
+++ b/Presentations/sd_calibration/material/sd_calib_2023_10_30/sd_calib_2023_10_30_filip.pptx
@@ -239,7 +239,7 @@
           <a:p>
             <a:fld id="{FA8F02CA-77CB-4E54-B712-21E588799EE8}" type="datetimeFigureOut">
               <a:rPr lang="de-DE" smtClean="0"/>
-              <a:t>27.10.2023</a:t>
+              <a:t>28.10.2023</a:t>
             </a:fld>
             <a:endParaRPr lang="de-DE"/>
           </a:p>
@@ -1014,7 +1014,7 @@
           <a:p>
             <a:fld id="{EF9F2463-8150-4DAA-877D-A146C8C8C60A}" type="datetime1">
               <a:rPr lang="de-DE" smtClean="0"/>
-              <a:t>27.10.2023</a:t>
+              <a:t>28.10.2023</a:t>
             </a:fld>
             <a:endParaRPr lang="de-DE"/>
           </a:p>
@@ -1256,7 +1256,7 @@
           <a:p>
             <a:fld id="{224C4683-D191-47F3-8302-BB2B36B1C86A}" type="datetime1">
               <a:rPr lang="de-DE" smtClean="0"/>
-              <a:t>27.10.2023</a:t>
+              <a:t>28.10.2023</a:t>
             </a:fld>
             <a:endParaRPr lang="de-DE"/>
           </a:p>
@@ -1455,7 +1455,7 @@
           <a:p>
             <a:fld id="{5E89BE91-4B1C-4025-AE57-60317864A3F3}" type="datetime1">
               <a:rPr lang="de-DE" smtClean="0"/>
-              <a:t>27.10.2023</a:t>
+              <a:t>28.10.2023</a:t>
             </a:fld>
             <a:endParaRPr lang="de-DE"/>
           </a:p>
@@ -1744,7 +1744,7 @@
           <a:p>
             <a:fld id="{3AD15D93-083F-4B89-951E-D5F35A1BBEC8}" type="datetime1">
               <a:rPr lang="de-DE" smtClean="0"/>
-              <a:t>27.10.2023</a:t>
+              <a:t>28.10.2023</a:t>
             </a:fld>
             <a:endParaRPr lang="de-DE"/>
           </a:p>
@@ -1986,7 +1986,7 @@
           <a:p>
             <a:fld id="{90C3E158-F33A-4782-AFB5-03A3FD6F0AB2}" type="datetime1">
               <a:rPr lang="de-DE" smtClean="0"/>
-              <a:t>27.10.2023</a:t>
+              <a:t>28.10.2023</a:t>
             </a:fld>
             <a:endParaRPr lang="de-DE"/>
           </a:p>
@@ -2185,7 +2185,7 @@
           <a:p>
             <a:fld id="{D8721E1A-6BCC-410F-B09E-4B322433CABE}" type="datetimeFigureOut">
               <a:rPr lang="en-US" smtClean="0"/>
-              <a:t>10/27/2023</a:t>
+              <a:t>10/28/2023</a:t>
             </a:fld>
             <a:endParaRPr lang="en-US"/>
           </a:p>
@@ -2385,7 +2385,7 @@
           <a:p>
             <a:fld id="{D8721E1A-6BCC-410F-B09E-4B322433CABE}" type="datetimeFigureOut">
               <a:rPr lang="en-US" smtClean="0"/>
-              <a:t>10/27/2023</a:t>
+              <a:t>10/28/2023</a:t>
             </a:fld>
             <a:endParaRPr lang="en-US"/>
           </a:p>
@@ -2661,7 +2661,7 @@
           <a:p>
             <a:fld id="{D8721E1A-6BCC-410F-B09E-4B322433CABE}" type="datetimeFigureOut">
               <a:rPr lang="en-US" smtClean="0"/>
-              <a:t>10/27/2023</a:t>
+              <a:t>10/28/2023</a:t>
             </a:fld>
             <a:endParaRPr lang="en-US"/>
           </a:p>
@@ -2929,7 +2929,7 @@
           <a:p>
             <a:fld id="{D8721E1A-6BCC-410F-B09E-4B322433CABE}" type="datetimeFigureOut">
               <a:rPr lang="en-US" smtClean="0"/>
-              <a:t>10/27/2023</a:t>
+              <a:t>10/28/2023</a:t>
             </a:fld>
             <a:endParaRPr lang="en-US"/>
           </a:p>
@@ -3344,7 +3344,7 @@
           <a:p>
             <a:fld id="{D8721E1A-6BCC-410F-B09E-4B322433CABE}" type="datetimeFigureOut">
               <a:rPr lang="en-US" smtClean="0"/>
-              <a:t>10/27/2023</a:t>
+              <a:t>10/28/2023</a:t>
             </a:fld>
             <a:endParaRPr lang="en-US"/>
           </a:p>
@@ -3531,7 +3531,7 @@
           <a:p>
             <a:fld id="{0A9BFA6A-9A63-4E2D-92C0-C77BFA750EDB}" type="datetime1">
               <a:rPr lang="de-DE" noProof="0" smtClean="0"/>
-              <a:t>27.10.2023</a:t>
+              <a:t>28.10.2023</a:t>
             </a:fld>
             <a:endParaRPr lang="en-US" noProof="0"/>
           </a:p>
@@ -3697,7 +3697,7 @@
           <a:p>
             <a:fld id="{D8721E1A-6BCC-410F-B09E-4B322433CABE}" type="datetimeFigureOut">
               <a:rPr lang="en-US" smtClean="0"/>
-              <a:t>10/27/2023</a:t>
+              <a:t>10/28/2023</a:t>
             </a:fld>
             <a:endParaRPr lang="en-US"/>
           </a:p>
@@ -3810,7 +3810,7 @@
           <a:p>
             <a:fld id="{D8721E1A-6BCC-410F-B09E-4B322433CABE}" type="datetimeFigureOut">
               <a:rPr lang="en-US" smtClean="0"/>
-              <a:t>10/27/2023</a:t>
+              <a:t>10/28/2023</a:t>
             </a:fld>
             <a:endParaRPr lang="en-US"/>
           </a:p>
@@ -4123,7 +4123,7 @@
           <a:p>
             <a:fld id="{D8721E1A-6BCC-410F-B09E-4B322433CABE}" type="datetimeFigureOut">
               <a:rPr lang="en-US" smtClean="0"/>
-              <a:t>10/27/2023</a:t>
+              <a:t>10/28/2023</a:t>
             </a:fld>
             <a:endParaRPr lang="en-US"/>
           </a:p>
@@ -4412,7 +4412,7 @@
           <a:p>
             <a:fld id="{D8721E1A-6BCC-410F-B09E-4B322433CABE}" type="datetimeFigureOut">
               <a:rPr lang="en-US" smtClean="0"/>
-              <a:t>10/27/2023</a:t>
+              <a:t>10/28/2023</a:t>
             </a:fld>
             <a:endParaRPr lang="en-US"/>
           </a:p>
@@ -4612,7 +4612,7 @@
           <a:p>
             <a:fld id="{D8721E1A-6BCC-410F-B09E-4B322433CABE}" type="datetimeFigureOut">
               <a:rPr lang="en-US" smtClean="0"/>
-              <a:t>10/27/2023</a:t>
+              <a:t>10/28/2023</a:t>
             </a:fld>
             <a:endParaRPr lang="en-US"/>
           </a:p>
@@ -4822,7 +4822,7 @@
           <a:p>
             <a:fld id="{D8721E1A-6BCC-410F-B09E-4B322433CABE}" type="datetimeFigureOut">
               <a:rPr lang="en-US" smtClean="0"/>
-              <a:t>10/27/2023</a:t>
+              <a:t>10/28/2023</a:t>
             </a:fld>
             <a:endParaRPr lang="en-US"/>
           </a:p>
@@ -5081,7 +5081,7 @@
           <a:p>
             <a:fld id="{43A9179C-E631-47AA-B9CB-ABFD8F596650}" type="datetime1">
               <a:rPr lang="de-DE" smtClean="0"/>
-              <a:t>27.10.2023</a:t>
+              <a:t>28.10.2023</a:t>
             </a:fld>
             <a:endParaRPr lang="de-DE"/>
           </a:p>
@@ -5335,7 +5335,7 @@
           <a:p>
             <a:fld id="{43A9179C-E631-47AA-B9CB-ABFD8F596650}" type="datetime1">
               <a:rPr lang="de-DE" smtClean="0"/>
-              <a:t>27.10.2023</a:t>
+              <a:t>28.10.2023</a:t>
             </a:fld>
             <a:endParaRPr lang="de-DE"/>
           </a:p>
@@ -5748,7 +5748,7 @@
           <a:p>
             <a:fld id="{88C61DB6-D53F-456D-8864-56CE29C6E6BA}" type="datetime1">
               <a:rPr lang="de-DE" smtClean="0"/>
-              <a:t>27.10.2023</a:t>
+              <a:t>28.10.2023</a:t>
             </a:fld>
             <a:endParaRPr lang="de-DE"/>
           </a:p>
@@ -6136,7 +6136,7 @@
           <a:p>
             <a:fld id="{88C61DB6-D53F-456D-8864-56CE29C6E6BA}" type="datetime1">
               <a:rPr lang="de-DE" smtClean="0"/>
-              <a:t>27.10.2023</a:t>
+              <a:t>28.10.2023</a:t>
             </a:fld>
             <a:endParaRPr lang="de-DE"/>
           </a:p>
@@ -6270,7 +6270,7 @@
           <a:p>
             <a:fld id="{0A1BF2A7-198D-4BCD-8375-CAC66677F609}" type="datetime1">
               <a:rPr lang="de-DE" smtClean="0"/>
-              <a:t>27.10.2023</a:t>
+              <a:t>28.10.2023</a:t>
             </a:fld>
             <a:endParaRPr lang="de-DE"/>
           </a:p>
@@ -6444,7 +6444,7 @@
           <a:p>
             <a:fld id="{0A1BF2A7-198D-4BCD-8375-CAC66677F609}" type="datetime1">
               <a:rPr lang="de-DE" smtClean="0"/>
-              <a:t>27.10.2023</a:t>
+              <a:t>28.10.2023</a:t>
             </a:fld>
             <a:endParaRPr lang="de-DE"/>
           </a:p>
@@ -6664,7 +6664,7 @@
           <a:p>
             <a:fld id="{0A1BF2A7-198D-4BCD-8375-CAC66677F609}" type="datetime1">
               <a:rPr lang="de-DE" smtClean="0"/>
-              <a:t>27.10.2023</a:t>
+              <a:t>28.10.2023</a:t>
             </a:fld>
             <a:endParaRPr lang="de-DE"/>
           </a:p>
@@ -6979,7 +6979,7 @@
             <a:fld id="{D440409C-9897-4940-8DB3-931E759C1E19}" type="datetime3">
               <a:rPr lang="en-US" smtClean="0"/>
               <a:pPr/>
-              <a:t>27 October 2023</a:t>
+              <a:t>28 October 2023</a:t>
             </a:fld>
             <a:endParaRPr lang="en-US" dirty="0"/>
           </a:p>
@@ -7801,7 +7801,7 @@
           <a:p>
             <a:fld id="{D8721E1A-6BCC-410F-B09E-4B322433CABE}" type="datetimeFigureOut">
               <a:rPr lang="en-US" smtClean="0"/>
-              <a:t>10/27/2023</a:t>
+              <a:t>10/28/2023</a:t>
             </a:fld>
             <a:endParaRPr lang="en-US"/>
           </a:p>
@@ -8431,7 +8431,7 @@
           <a:p>
             <a:fld id="{0A9BFA6A-9A63-4E2D-92C0-C77BFA750EDB}" type="datetime1">
               <a:rPr lang="de-DE" noProof="0" smtClean="0"/>
-              <a:t>27.10.2023</a:t>
+              <a:t>28.10.2023</a:t>
             </a:fld>
             <a:endParaRPr lang="en-US" noProof="0"/>
           </a:p>
@@ -8574,7 +8574,7 @@
           <a:p>
             <a:fld id="{0A9BFA6A-9A63-4E2D-92C0-C77BFA750EDB}" type="datetime1">
               <a:rPr lang="de-DE" noProof="0" smtClean="0"/>
-              <a:t>27.10.2023</a:t>
+              <a:t>28.10.2023</a:t>
             </a:fld>
             <a:endParaRPr lang="en-US" noProof="0"/>
           </a:p>
@@ -8686,7 +8686,7 @@
           <a:p>
             <a:fld id="{0A9BFA6A-9A63-4E2D-92C0-C77BFA750EDB}" type="datetime1">
               <a:rPr lang="de-DE" noProof="0" smtClean="0"/>
-              <a:t>27.10.2023</a:t>
+              <a:t>28.10.2023</a:t>
             </a:fld>
             <a:endParaRPr lang="en-US" noProof="0"/>
           </a:p>
@@ -8918,7 +8918,7 @@
           <a:p>
             <a:fld id="{0A9BFA6A-9A63-4E2D-92C0-C77BFA750EDB}" type="datetime1">
               <a:rPr lang="de-DE" noProof="0" smtClean="0"/>
-              <a:t>27.10.2023</a:t>
+              <a:t>28.10.2023</a:t>
             </a:fld>
             <a:endParaRPr lang="en-US" noProof="0"/>
           </a:p>
@@ -9208,7 +9208,7 @@
           <a:p>
             <a:fld id="{0A9BFA6A-9A63-4E2D-92C0-C77BFA750EDB}" type="datetime1">
               <a:rPr lang="de-DE" noProof="0" smtClean="0"/>
-              <a:t>27.10.2023</a:t>
+              <a:t>28.10.2023</a:t>
             </a:fld>
             <a:endParaRPr lang="en-US" noProof="0"/>
           </a:p>
@@ -9755,7 +9755,7 @@
           <a:p>
             <a:fld id="{C7355B21-B324-434D-ABB6-684CB6180B39}" type="datetime1">
               <a:rPr lang="de-DE" smtClean="0"/>
-              <a:t>27.10.2023</a:t>
+              <a:t>28.10.2023</a:t>
             </a:fld>
             <a:endParaRPr lang="de-DE"/>
           </a:p>
@@ -10304,7 +10304,7 @@
           <a:p>
             <a:fld id="{0A9BFA6A-9A63-4E2D-92C0-C77BFA750EDB}" type="datetime1">
               <a:rPr lang="de-DE" noProof="0" smtClean="0"/>
-              <a:t>27.10.2023</a:t>
+              <a:t>28.10.2023</a:t>
             </a:fld>
             <a:endParaRPr lang="en-US" noProof="0"/>
           </a:p>
@@ -10571,7 +10571,7 @@
           <a:p>
             <a:fld id="{0A9BFA6A-9A63-4E2D-92C0-C77BFA750EDB}" type="datetime1">
               <a:rPr lang="de-DE" noProof="0" smtClean="0"/>
-              <a:t>27.10.2023</a:t>
+              <a:t>28.10.2023</a:t>
             </a:fld>
             <a:endParaRPr lang="en-US" noProof="0"/>
           </a:p>
@@ -10705,7 +10705,7 @@
           <a:p>
             <a:fld id="{0A9BFA6A-9A63-4E2D-92C0-C77BFA750EDB}" type="datetime1">
               <a:rPr lang="de-DE" noProof="0" smtClean="0"/>
-              <a:t>27.10.2023</a:t>
+              <a:t>28.10.2023</a:t>
             </a:fld>
             <a:endParaRPr lang="en-US" noProof="0"/>
           </a:p>
@@ -10841,7 +10841,7 @@
           <a:p>
             <a:fld id="{0A9BFA6A-9A63-4E2D-92C0-C77BFA750EDB}" type="datetime1">
               <a:rPr lang="de-DE" noProof="0" smtClean="0"/>
-              <a:t>27.10.2023</a:t>
+              <a:t>28.10.2023</a:t>
             </a:fld>
             <a:endParaRPr lang="en-US" noProof="0"/>
           </a:p>
@@ -10960,8 +10960,8 @@
           <a:chExt cx="0" cy="0"/>
         </a:xfrm>
       </p:grpSpPr>
-      <mc:AlternateContent xmlns:mc="http://schemas.openxmlformats.org/markup-compatibility/2006">
-        <mc:Choice xmlns:a14="http://schemas.microsoft.com/office/drawing/2010/main" Requires="a14">
+      <mc:AlternateContent xmlns:mc="http://schemas.openxmlformats.org/markup-compatibility/2006" xmlns:a14="http://schemas.microsoft.com/office/drawing/2010/main">
+        <mc:Choice Requires="a14">
           <p:sp>
             <p:nvSpPr>
               <p:cNvPr id="8" name="Inhaltsplatzhalter 7"/>
@@ -11459,7 +11459,7 @@
             </p:txBody>
           </p:sp>
         </mc:Choice>
-        <mc:Fallback>
+        <mc:Fallback xmlns="">
           <p:sp>
             <p:nvSpPr>
               <p:cNvPr id="8" name="Inhaltsplatzhalter 7"/>
@@ -11544,7 +11544,7 @@
           <a:p>
             <a:fld id="{0A9BFA6A-9A63-4E2D-92C0-C77BFA750EDB}" type="datetime1">
               <a:rPr lang="de-DE" noProof="0" smtClean="0"/>
-              <a:t>27.10.2023</a:t>
+              <a:t>28.10.2023</a:t>
             </a:fld>
             <a:endParaRPr lang="en-US" noProof="0"/>
           </a:p>
@@ -11719,8 +11719,8 @@
           <a:chExt cx="0" cy="0"/>
         </a:xfrm>
       </p:grpSpPr>
-      <mc:AlternateContent xmlns:mc="http://schemas.openxmlformats.org/markup-compatibility/2006">
-        <mc:Choice xmlns:a14="http://schemas.microsoft.com/office/drawing/2010/main" Requires="a14">
+      <mc:AlternateContent xmlns:mc="http://schemas.openxmlformats.org/markup-compatibility/2006" xmlns:a14="http://schemas.microsoft.com/office/drawing/2010/main">
+        <mc:Choice Requires="a14">
           <p:sp>
             <p:nvSpPr>
               <p:cNvPr id="8" name="Inhaltsplatzhalter 7"/>
@@ -12036,7 +12036,7 @@
             </p:txBody>
           </p:sp>
         </mc:Choice>
-        <mc:Fallback>
+        <mc:Fallback xmlns="">
           <p:sp>
             <p:nvSpPr>
               <p:cNvPr id="8" name="Inhaltsplatzhalter 7"/>
@@ -12091,7 +12091,7 @@
           <a:p>
             <a:fld id="{0A9BFA6A-9A63-4E2D-92C0-C77BFA750EDB}" type="datetime1">
               <a:rPr lang="de-DE" noProof="0" smtClean="0"/>
-              <a:t>27.10.2023</a:t>
+              <a:t>28.10.2023</a:t>
             </a:fld>
             <a:endParaRPr lang="en-US" noProof="0"/>
           </a:p>
@@ -12272,7 +12272,7 @@
           <a:p>
             <a:fld id="{0A9BFA6A-9A63-4E2D-92C0-C77BFA750EDB}" type="datetime1">
               <a:rPr lang="de-DE" noProof="0" smtClean="0"/>
-              <a:t>27.10.2023</a:t>
+              <a:t>28.10.2023</a:t>
             </a:fld>
             <a:endParaRPr lang="en-US" noProof="0"/>
           </a:p>
@@ -12416,8 +12416,8 @@
           </a:p>
         </p:txBody>
       </p:sp>
-      <mc:AlternateContent xmlns:mc="http://schemas.openxmlformats.org/markup-compatibility/2006">
-        <mc:Choice xmlns:a14="http://schemas.microsoft.com/office/drawing/2010/main" Requires="a14">
+      <mc:AlternateContent xmlns:mc="http://schemas.openxmlformats.org/markup-compatibility/2006" xmlns:a14="http://schemas.microsoft.com/office/drawing/2010/main">
+        <mc:Choice Requires="a14">
           <p:sp>
             <p:nvSpPr>
               <p:cNvPr id="13" name="Textfeld 12">
@@ -12486,7 +12486,7 @@
             </p:txBody>
           </p:sp>
         </mc:Choice>
-        <mc:Fallback>
+        <mc:Fallback xmlns="">
           <p:sp>
             <p:nvSpPr>
               <p:cNvPr id="13" name="Textfeld 12">
@@ -12531,8 +12531,8 @@
           </p:sp>
         </mc:Fallback>
       </mc:AlternateContent>
-      <mc:AlternateContent xmlns:mc="http://schemas.openxmlformats.org/markup-compatibility/2006">
-        <mc:Choice xmlns:a14="http://schemas.microsoft.com/office/drawing/2010/main" Requires="a14">
+      <mc:AlternateContent xmlns:mc="http://schemas.openxmlformats.org/markup-compatibility/2006" xmlns:a14="http://schemas.microsoft.com/office/drawing/2010/main">
+        <mc:Choice Requires="a14">
           <p:sp>
             <p:nvSpPr>
               <p:cNvPr id="14" name="Textfeld 13">
@@ -12601,7 +12601,7 @@
             </p:txBody>
           </p:sp>
         </mc:Choice>
-        <mc:Fallback>
+        <mc:Fallback xmlns="">
           <p:sp>
             <p:nvSpPr>
               <p:cNvPr id="14" name="Textfeld 13">
@@ -12646,8 +12646,8 @@
           </p:sp>
         </mc:Fallback>
       </mc:AlternateContent>
-      <mc:AlternateContent xmlns:mc="http://schemas.openxmlformats.org/markup-compatibility/2006">
-        <mc:Choice xmlns:a14="http://schemas.microsoft.com/office/drawing/2010/main" Requires="a14">
+      <mc:AlternateContent xmlns:mc="http://schemas.openxmlformats.org/markup-compatibility/2006" xmlns:a14="http://schemas.microsoft.com/office/drawing/2010/main">
+        <mc:Choice Requires="a14">
           <p:sp>
             <p:nvSpPr>
               <p:cNvPr id="19" name="Textfeld 18">
@@ -13182,7 +13182,7 @@
             </p:txBody>
           </p:sp>
         </mc:Choice>
-        <mc:Fallback>
+        <mc:Fallback xmlns="">
           <p:sp>
             <p:nvSpPr>
               <p:cNvPr id="19" name="Textfeld 18">
@@ -13309,8 +13309,8 @@
           </a:p>
         </p:txBody>
       </p:sp>
-      <mc:AlternateContent xmlns:mc="http://schemas.openxmlformats.org/markup-compatibility/2006">
-        <mc:Choice xmlns:a14="http://schemas.microsoft.com/office/drawing/2010/main" Requires="a14">
+      <mc:AlternateContent xmlns:mc="http://schemas.openxmlformats.org/markup-compatibility/2006" xmlns:a14="http://schemas.microsoft.com/office/drawing/2010/main">
+        <mc:Choice Requires="a14">
           <p:sp>
             <p:nvSpPr>
               <p:cNvPr id="8" name="Textfeld 7">
@@ -13431,7 +13431,7 @@
             </p:txBody>
           </p:sp>
         </mc:Choice>
-        <mc:Fallback>
+        <mc:Fallback xmlns="">
           <p:sp>
             <p:nvSpPr>
               <p:cNvPr id="8" name="Textfeld 7">
@@ -13559,7 +13559,7 @@
           <a:p>
             <a:fld id="{0A9BFA6A-9A63-4E2D-92C0-C77BFA750EDB}" type="datetime1">
               <a:rPr lang="de-DE" noProof="0" smtClean="0"/>
-              <a:t>27.10.2023</a:t>
+              <a:t>28.10.2023</a:t>
             </a:fld>
             <a:endParaRPr lang="en-US" noProof="0"/>
           </a:p>
@@ -13703,8 +13703,8 @@
           </a:p>
         </p:txBody>
       </p:sp>
-      <mc:AlternateContent xmlns:mc="http://schemas.openxmlformats.org/markup-compatibility/2006">
-        <mc:Choice xmlns:a14="http://schemas.microsoft.com/office/drawing/2010/main" Requires="a14">
+      <mc:AlternateContent xmlns:mc="http://schemas.openxmlformats.org/markup-compatibility/2006" xmlns:a14="http://schemas.microsoft.com/office/drawing/2010/main">
+        <mc:Choice Requires="a14">
           <p:sp>
             <p:nvSpPr>
               <p:cNvPr id="13" name="Textfeld 12">
@@ -13733,6 +13733,7 @@
               </a:bodyPr>
               <a:lstStyle/>
               <a:p>
+                <a:pPr/>
                 <a14:m>
                   <m:oMathPara xmlns:m="http://schemas.openxmlformats.org/officeDocument/2006/math">
                     <m:oMathParaPr>
@@ -13772,7 +13773,7 @@
             </p:txBody>
           </p:sp>
         </mc:Choice>
-        <mc:Fallback>
+        <mc:Fallback xmlns="">
           <p:sp>
             <p:nvSpPr>
               <p:cNvPr id="13" name="Textfeld 12">
@@ -13817,8 +13818,8 @@
           </p:sp>
         </mc:Fallback>
       </mc:AlternateContent>
-      <mc:AlternateContent xmlns:mc="http://schemas.openxmlformats.org/markup-compatibility/2006">
-        <mc:Choice xmlns:a14="http://schemas.microsoft.com/office/drawing/2010/main" Requires="a14">
+      <mc:AlternateContent xmlns:mc="http://schemas.openxmlformats.org/markup-compatibility/2006" xmlns:a14="http://schemas.microsoft.com/office/drawing/2010/main">
+        <mc:Choice Requires="a14">
           <p:sp>
             <p:nvSpPr>
               <p:cNvPr id="14" name="Textfeld 13">
@@ -13847,6 +13848,7 @@
               </a:bodyPr>
               <a:lstStyle/>
               <a:p>
+                <a:pPr/>
                 <a14:m>
                   <m:oMathPara xmlns:m="http://schemas.openxmlformats.org/officeDocument/2006/math">
                     <m:oMathParaPr>
@@ -13886,7 +13888,7 @@
             </p:txBody>
           </p:sp>
         </mc:Choice>
-        <mc:Fallback>
+        <mc:Fallback xmlns="">
           <p:sp>
             <p:nvSpPr>
               <p:cNvPr id="14" name="Textfeld 13">
@@ -13931,8 +13933,8 @@
           </p:sp>
         </mc:Fallback>
       </mc:AlternateContent>
-      <mc:AlternateContent xmlns:mc="http://schemas.openxmlformats.org/markup-compatibility/2006">
-        <mc:Choice xmlns:a14="http://schemas.microsoft.com/office/drawing/2010/main" Requires="a14">
+      <mc:AlternateContent xmlns:mc="http://schemas.openxmlformats.org/markup-compatibility/2006" xmlns:a14="http://schemas.microsoft.com/office/drawing/2010/main">
+        <mc:Choice Requires="a14">
           <p:sp>
             <p:nvSpPr>
               <p:cNvPr id="19" name="Textfeld 18">
@@ -14467,7 +14469,7 @@
             </p:txBody>
           </p:sp>
         </mc:Choice>
-        <mc:Fallback>
+        <mc:Fallback xmlns="">
           <p:sp>
             <p:nvSpPr>
               <p:cNvPr id="19" name="Textfeld 18">
@@ -14732,8 +14734,8 @@
           </a:fontRef>
         </p:style>
       </p:cxnSp>
-      <mc:AlternateContent xmlns:mc="http://schemas.openxmlformats.org/markup-compatibility/2006">
-        <mc:Choice xmlns:a14="http://schemas.microsoft.com/office/drawing/2010/main" Requires="a14">
+      <mc:AlternateContent xmlns:mc="http://schemas.openxmlformats.org/markup-compatibility/2006" xmlns:a14="http://schemas.microsoft.com/office/drawing/2010/main">
+        <mc:Choice Requires="a14">
           <p:sp>
             <p:nvSpPr>
               <p:cNvPr id="30" name="Textfeld 29">
@@ -14860,7 +14862,7 @@
             </p:txBody>
           </p:sp>
         </mc:Choice>
-        <mc:Fallback>
+        <mc:Fallback xmlns="">
           <p:sp>
             <p:nvSpPr>
               <p:cNvPr id="30" name="Textfeld 29">
@@ -14951,8 +14953,8 @@
           </a:p>
         </p:txBody>
       </p:sp>
-      <mc:AlternateContent xmlns:mc="http://schemas.openxmlformats.org/markup-compatibility/2006">
-        <mc:Choice xmlns:a14="http://schemas.microsoft.com/office/drawing/2010/main" Requires="a14">
+      <mc:AlternateContent xmlns:mc="http://schemas.openxmlformats.org/markup-compatibility/2006" xmlns:a14="http://schemas.microsoft.com/office/drawing/2010/main">
+        <mc:Choice Requires="a14">
           <p:sp>
             <p:nvSpPr>
               <p:cNvPr id="32" name="Textfeld 31">
@@ -15073,7 +15075,7 @@
             </p:txBody>
           </p:sp>
         </mc:Choice>
-        <mc:Fallback>
+        <mc:Fallback xmlns="">
           <p:sp>
             <p:nvSpPr>
               <p:cNvPr id="32" name="Textfeld 31">
@@ -15164,8 +15166,8 @@
           </a:p>
         </p:txBody>
       </p:sp>
-      <mc:AlternateContent xmlns:mc="http://schemas.openxmlformats.org/markup-compatibility/2006">
-        <mc:Choice xmlns:a14="http://schemas.microsoft.com/office/drawing/2010/main" Requires="a14">
+      <mc:AlternateContent xmlns:mc="http://schemas.openxmlformats.org/markup-compatibility/2006" xmlns:a14="http://schemas.microsoft.com/office/drawing/2010/main">
+        <mc:Choice Requires="a14">
           <p:sp>
             <p:nvSpPr>
               <p:cNvPr id="34" name="Textfeld 33">
@@ -15194,6 +15196,7 @@
               </a:bodyPr>
               <a:lstStyle/>
               <a:p>
+                <a:pPr/>
                 <a14:m>
                   <m:oMathPara xmlns:m="http://schemas.openxmlformats.org/officeDocument/2006/math">
                     <m:oMathParaPr>
@@ -15223,7 +15226,7 @@
             </p:txBody>
           </p:sp>
         </mc:Choice>
-        <mc:Fallback>
+        <mc:Fallback xmlns="">
           <p:sp>
             <p:nvSpPr>
               <p:cNvPr id="34" name="Textfeld 33">
@@ -15405,7 +15408,7 @@
           <a:p>
             <a:fld id="{0A9BFA6A-9A63-4E2D-92C0-C77BFA750EDB}" type="datetime1">
               <a:rPr lang="de-DE" noProof="0" smtClean="0"/>
-              <a:t>27.10.2023</a:t>
+              <a:t>28.10.2023</a:t>
             </a:fld>
             <a:endParaRPr lang="en-US" noProof="0"/>
           </a:p>
@@ -15533,8 +15536,8 @@
           </a:fontRef>
         </p:style>
       </p:cxnSp>
-      <mc:AlternateContent xmlns:mc="http://schemas.openxmlformats.org/markup-compatibility/2006">
-        <mc:Choice xmlns:a14="http://schemas.microsoft.com/office/drawing/2010/main" Requires="a14">
+      <mc:AlternateContent xmlns:mc="http://schemas.openxmlformats.org/markup-compatibility/2006" xmlns:a14="http://schemas.microsoft.com/office/drawing/2010/main">
+        <mc:Choice Requires="a14">
           <p:sp>
             <p:nvSpPr>
               <p:cNvPr id="30" name="Textfeld 29">
@@ -15661,7 +15664,7 @@
             </p:txBody>
           </p:sp>
         </mc:Choice>
-        <mc:Fallback>
+        <mc:Fallback xmlns="">
           <p:sp>
             <p:nvSpPr>
               <p:cNvPr id="30" name="Textfeld 29">
@@ -15752,8 +15755,8 @@
           </a:p>
         </p:txBody>
       </p:sp>
-      <mc:AlternateContent xmlns:mc="http://schemas.openxmlformats.org/markup-compatibility/2006">
-        <mc:Choice xmlns:a14="http://schemas.microsoft.com/office/drawing/2010/main" Requires="a14">
+      <mc:AlternateContent xmlns:mc="http://schemas.openxmlformats.org/markup-compatibility/2006" xmlns:a14="http://schemas.microsoft.com/office/drawing/2010/main">
+        <mc:Choice Requires="a14">
           <p:sp>
             <p:nvSpPr>
               <p:cNvPr id="32" name="Textfeld 31">
@@ -15847,25 +15850,7 @@
                             <a:rPr lang="de-DE" sz="1100" b="0" i="1" smtClean="0">
                               <a:latin typeface="Cambria Math" panose="02040503050406030204" pitchFamily="18" charset="0"/>
                             </a:rPr>
-                            <m:t>42.8</m:t>
-                          </m:r>
-                          <m:r>
-                            <a:rPr lang="de-DE" sz="1100" b="0" i="1" smtClean="0">
-                              <a:latin typeface="Cambria Math" panose="02040503050406030204" pitchFamily="18" charset="0"/>
-                            </a:rPr>
-                            <m:t>0</m:t>
-                          </m:r>
-                          <m:r>
-                            <a:rPr lang="de-DE" sz="1100" b="0" i="1" smtClean="0">
-                              <a:latin typeface="Cambria Math" panose="02040503050406030204" pitchFamily="18" charset="0"/>
-                            </a:rPr>
-                            <m:t>±0.</m:t>
-                          </m:r>
-                          <m:r>
-                            <a:rPr lang="de-DE" sz="1100" b="0" i="1" smtClean="0">
-                              <a:latin typeface="Cambria Math" panose="02040503050406030204" pitchFamily="18" charset="0"/>
-                            </a:rPr>
-                            <m:t>498</m:t>
+                            <m:t>42.80±0.498</m:t>
                           </m:r>
                         </m:e>
                       </m:d>
@@ -15892,7 +15877,7 @@
             </p:txBody>
           </p:sp>
         </mc:Choice>
-        <mc:Fallback>
+        <mc:Fallback xmlns="">
           <p:sp>
             <p:nvSpPr>
               <p:cNvPr id="32" name="Textfeld 31">
@@ -15983,8 +15968,8 @@
           </a:p>
         </p:txBody>
       </p:sp>
-      <mc:AlternateContent xmlns:mc="http://schemas.openxmlformats.org/markup-compatibility/2006">
-        <mc:Choice xmlns:a14="http://schemas.microsoft.com/office/drawing/2010/main" Requires="a14">
+      <mc:AlternateContent xmlns:mc="http://schemas.openxmlformats.org/markup-compatibility/2006" xmlns:a14="http://schemas.microsoft.com/office/drawing/2010/main">
+        <mc:Choice Requires="a14">
           <p:sp>
             <p:nvSpPr>
               <p:cNvPr id="34" name="Textfeld 33">
@@ -16043,7 +16028,7 @@
             </p:txBody>
           </p:sp>
         </mc:Choice>
-        <mc:Fallback>
+        <mc:Fallback xmlns="">
           <p:sp>
             <p:nvSpPr>
               <p:cNvPr id="34" name="Textfeld 33">
@@ -16088,8 +16073,8 @@
           </p:sp>
         </mc:Fallback>
       </mc:AlternateContent>
-      <mc:AlternateContent xmlns:mc="http://schemas.openxmlformats.org/markup-compatibility/2006">
-        <mc:Choice xmlns:a14="http://schemas.microsoft.com/office/drawing/2010/main" Requires="a14">
+      <mc:AlternateContent xmlns:mc="http://schemas.openxmlformats.org/markup-compatibility/2006" xmlns:a14="http://schemas.microsoft.com/office/drawing/2010/main">
+        <mc:Choice Requires="a14">
           <p:graphicFrame>
             <p:nvGraphicFramePr>
               <p:cNvPr id="2" name="Tabelle 1">
@@ -16821,7 +16806,7 @@
             </a:graphic>
           </p:graphicFrame>
         </mc:Choice>
-        <mc:Fallback>
+        <mc:Fallback xmlns="">
           <p:graphicFrame>
             <p:nvGraphicFramePr>
               <p:cNvPr id="2" name="Tabelle 1">
@@ -17209,8 +17194,8 @@
           </a:p>
         </p:txBody>
       </p:sp>
-      <mc:AlternateContent xmlns:mc="http://schemas.openxmlformats.org/markup-compatibility/2006">
-        <mc:Choice xmlns:a14="http://schemas.microsoft.com/office/drawing/2010/main" Requires="a14">
+      <mc:AlternateContent xmlns:mc="http://schemas.openxmlformats.org/markup-compatibility/2006" xmlns:a14="http://schemas.microsoft.com/office/drawing/2010/main">
+        <mc:Choice Requires="a14">
           <p:sp>
             <p:nvSpPr>
               <p:cNvPr id="7" name="Textfeld 6">
@@ -17267,7 +17252,7 @@
             </p:txBody>
           </p:sp>
         </mc:Choice>
-        <mc:Fallback>
+        <mc:Fallback xmlns="">
           <p:sp>
             <p:nvSpPr>
               <p:cNvPr id="7" name="Textfeld 6">
@@ -17312,6 +17297,58 @@
           </p:sp>
         </mc:Fallback>
       </mc:AlternateContent>
+      <p:sp>
+        <p:nvSpPr>
+          <p:cNvPr id="8" name="Rechteck 7">
+            <a:extLst>
+              <a:ext uri="{FF2B5EF4-FFF2-40B4-BE49-F238E27FC236}">
+                <a16:creationId xmlns:a16="http://schemas.microsoft.com/office/drawing/2014/main" id="{55CCBF41-8D46-9B57-FB18-D7C16FC9F02C}"/>
+              </a:ext>
+            </a:extLst>
+          </p:cNvPr>
+          <p:cNvSpPr/>
+          <p:nvPr/>
+        </p:nvSpPr>
+        <p:spPr>
+          <a:xfrm>
+            <a:off x="4986130" y="3570326"/>
+            <a:ext cx="1505870" cy="1108167"/>
+          </a:xfrm>
+          <a:prstGeom prst="rect">
+            <a:avLst/>
+          </a:prstGeom>
+          <a:noFill/>
+          <a:ln w="38100">
+            <a:solidFill>
+              <a:srgbClr val="C00000"/>
+            </a:solidFill>
+          </a:ln>
+        </p:spPr>
+        <p:style>
+          <a:lnRef idx="2">
+            <a:schemeClr val="accent1">
+              <a:shade val="15000"/>
+            </a:schemeClr>
+          </a:lnRef>
+          <a:fillRef idx="1">
+            <a:schemeClr val="accent1"/>
+          </a:fillRef>
+          <a:effectRef idx="0">
+            <a:schemeClr val="accent1"/>
+          </a:effectRef>
+          <a:fontRef idx="minor">
+            <a:schemeClr val="lt1"/>
+          </a:fontRef>
+        </p:style>
+        <p:txBody>
+          <a:bodyPr rtlCol="0" anchor="ctr"/>
+          <a:lstStyle/>
+          <a:p>
+            <a:pPr algn="ctr"/>
+            <a:endParaRPr lang="en-US"/>
+          </a:p>
+        </p:txBody>
+      </p:sp>
     </p:spTree>
     <p:extLst>
       <p:ext uri="{BB962C8B-B14F-4D97-AF65-F5344CB8AC3E}">
@@ -17359,7 +17396,7 @@
           <a:p>
             <a:fld id="{0A9BFA6A-9A63-4E2D-92C0-C77BFA750EDB}" type="datetime1">
               <a:rPr lang="de-DE" noProof="0" smtClean="0"/>
-              <a:t>27.10.2023</a:t>
+              <a:t>28.10.2023</a:t>
             </a:fld>
             <a:endParaRPr lang="en-US" noProof="0"/>
           </a:p>
@@ -17411,8 +17448,8 @@
           </a:p>
         </p:txBody>
       </p:sp>
-      <mc:AlternateContent xmlns:mc="http://schemas.openxmlformats.org/markup-compatibility/2006">
-        <mc:Choice xmlns:a14="http://schemas.microsoft.com/office/drawing/2010/main" Requires="a14">
+      <mc:AlternateContent xmlns:mc="http://schemas.openxmlformats.org/markup-compatibility/2006" xmlns:a14="http://schemas.microsoft.com/office/drawing/2010/main">
+        <mc:Choice Requires="a14">
           <p:sp>
             <p:nvSpPr>
               <p:cNvPr id="7" name="Inhaltsplatzhalter 7">
@@ -17550,7 +17587,7 @@
             </p:txBody>
           </p:sp>
         </mc:Choice>
-        <mc:Fallback>
+        <mc:Fallback xmlns="">
           <p:sp>
             <p:nvSpPr>
               <p:cNvPr id="7" name="Inhaltsplatzhalter 7">
@@ -17759,7 +17796,7 @@
           <a:p>
             <a:fld id="{0A9BFA6A-9A63-4E2D-92C0-C77BFA750EDB}" type="datetime1">
               <a:rPr lang="de-DE" noProof="0" smtClean="0"/>
-              <a:t>27.10.2023</a:t>
+              <a:t>28.10.2023</a:t>
             </a:fld>
             <a:endParaRPr lang="en-US" noProof="0"/>
           </a:p>
@@ -17828,13 +17865,13 @@
               <p:nvPr>
                 <p:extLst>
                   <p:ext uri="{D42A27DB-BD31-4B8C-83A1-F6EECF244321}">
-                    <p14:modId xmlns:p14="http://schemas.microsoft.com/office/powerpoint/2010/main" val="1369428207"/>
+                    <p14:modId xmlns:p14="http://schemas.microsoft.com/office/powerpoint/2010/main" val="1765281165"/>
                   </p:ext>
                 </p:extLst>
               </p:nvPr>
             </p:nvGraphicFramePr>
             <p:xfrm>
-              <a:off x="68580" y="3408898"/>
+              <a:off x="60960" y="3380318"/>
               <a:ext cx="4907280" cy="1645582"/>
             </p:xfrm>
             <a:graphic>
@@ -18149,19 +18186,7 @@
                                   <a:rPr lang="de-DE" b="0" i="1" smtClean="0">
                                     <a:latin typeface="Cambria Math" panose="02040503050406030204" pitchFamily="18" charset="0"/>
                                   </a:rPr>
-                                  <m:t>46.92</m:t>
-                                </m:r>
-                                <m:r>
-                                  <a:rPr lang="de-DE" b="0" i="1" smtClean="0">
-                                    <a:latin typeface="Cambria Math" panose="02040503050406030204" pitchFamily="18" charset="0"/>
-                                  </a:rPr>
-                                  <m:t>±</m:t>
-                                </m:r>
-                                <m:r>
-                                  <a:rPr lang="de-DE" b="0" i="1" smtClean="0">
-                                    <a:latin typeface="Cambria Math" panose="02040503050406030204" pitchFamily="18" charset="0"/>
-                                  </a:rPr>
-                                  <m:t>0.347</m:t>
+                                  <m:t>46.92±0.347</m:t>
                                 </m:r>
                               </m:oMath>
                             </m:oMathPara>
@@ -18203,7 +18228,7 @@
                                   <a:rPr lang="de-DE" b="0" i="1" smtClean="0">
                                     <a:latin typeface="Cambria Math" panose="02040503050406030204" pitchFamily="18" charset="0"/>
                                   </a:rPr>
-                                  <m:t>12</m:t>
+                                  <m:t>17</m:t>
                                 </m:r>
                                 <m:r>
                                   <a:rPr lang="de-DE" b="0" i="1" smtClean="0">
@@ -18215,7 +18240,7 @@
                                   <a:rPr lang="de-DE" b="0" i="1" smtClean="0">
                                     <a:latin typeface="Cambria Math" panose="02040503050406030204" pitchFamily="18" charset="0"/>
                                   </a:rPr>
-                                  <m:t>0</m:t>
+                                  <m:t>1</m:t>
                                 </m:r>
                               </m:oMath>
                             </m:oMathPara>
@@ -18257,7 +18282,7 @@
                                   <a:rPr lang="de-DE" b="0" i="1" smtClean="0">
                                     <a:latin typeface="Cambria Math" panose="02040503050406030204" pitchFamily="18" charset="0"/>
                                   </a:rPr>
-                                  <m:t>0.26</m:t>
+                                  <m:t>0.37</m:t>
                                 </m:r>
                                 <m:r>
                                   <a:rPr lang="de-DE" b="0" i="1" smtClean="0">
@@ -18269,7 +18294,13 @@
                                   <a:rPr lang="de-DE" b="0" i="1" smtClean="0">
                                     <a:latin typeface="Cambria Math" panose="02040503050406030204" pitchFamily="18" charset="0"/>
                                   </a:rPr>
-                                  <m:t>02</m:t>
+                                  <m:t>2</m:t>
+                                </m:r>
+                                <m:r>
+                                  <a:rPr lang="de-DE" b="0" i="1" smtClean="0">
+                                    <a:latin typeface="Cambria Math" panose="02040503050406030204" pitchFamily="18" charset="0"/>
+                                  </a:rPr>
+                                  <m:t>2</m:t>
                                 </m:r>
                               </m:oMath>
                             </m:oMathPara>
@@ -18333,19 +18364,7 @@
                                   <a:rPr lang="de-DE" b="0" i="1" smtClean="0">
                                     <a:latin typeface="Cambria Math" panose="02040503050406030204" pitchFamily="18" charset="0"/>
                                   </a:rPr>
-                                  <m:t>42.22</m:t>
-                                </m:r>
-                                <m:r>
-                                  <a:rPr lang="de-DE" b="0" i="1" smtClean="0">
-                                    <a:latin typeface="Cambria Math" panose="02040503050406030204" pitchFamily="18" charset="0"/>
-                                  </a:rPr>
-                                  <m:t>±0.4</m:t>
-                                </m:r>
-                                <m:r>
-                                  <a:rPr lang="de-DE" b="0" i="1" smtClean="0">
-                                    <a:latin typeface="Cambria Math" panose="02040503050406030204" pitchFamily="18" charset="0"/>
-                                  </a:rPr>
-                                  <m:t>47</m:t>
+                                  <m:t>42.22±0.447</m:t>
                                 </m:r>
                               </m:oMath>
                             </m:oMathPara>
@@ -18387,7 +18406,7 @@
                                   <a:rPr lang="de-DE" b="0" i="1" smtClean="0">
                                     <a:latin typeface="Cambria Math" panose="02040503050406030204" pitchFamily="18" charset="0"/>
                                   </a:rPr>
-                                  <m:t>12</m:t>
+                                  <m:t>19</m:t>
                                 </m:r>
                                 <m:r>
                                   <a:rPr lang="de-DE" b="0" i="1" smtClean="0">
@@ -18399,7 +18418,7 @@
                                   <a:rPr lang="de-DE" b="0" i="1" smtClean="0">
                                     <a:latin typeface="Cambria Math" panose="02040503050406030204" pitchFamily="18" charset="0"/>
                                   </a:rPr>
-                                  <m:t>0</m:t>
+                                  <m:t>5</m:t>
                                 </m:r>
                               </m:oMath>
                             </m:oMathPara>
@@ -18432,19 +18451,33 @@
                             <a:defRPr/>
                           </a:pPr>
                           <a14:m>
-                            <m:oMath xmlns:m="http://schemas.openxmlformats.org/officeDocument/2006/math">
-                              <m:r>
-                                <a:rPr lang="de-DE" b="0" i="1" smtClean="0">
-                                  <a:latin typeface="Cambria Math" panose="02040503050406030204" pitchFamily="18" charset="0"/>
-                                </a:rPr>
-                                <m:t>0.28±0.00</m:t>
-                              </m:r>
-                            </m:oMath>
+                            <m:oMathPara xmlns:m="http://schemas.openxmlformats.org/officeDocument/2006/math">
+                              <m:oMathParaPr>
+                                <m:jc m:val="centerGroup"/>
+                              </m:oMathParaPr>
+                              <m:oMath xmlns:m="http://schemas.openxmlformats.org/officeDocument/2006/math">
+                                <m:r>
+                                  <a:rPr lang="de-DE" b="0" i="1" smtClean="0">
+                                    <a:latin typeface="Cambria Math" panose="02040503050406030204" pitchFamily="18" charset="0"/>
+                                  </a:rPr>
+                                  <m:t>0.47</m:t>
+                                </m:r>
+                                <m:r>
+                                  <a:rPr lang="de-DE" b="0" i="1" smtClean="0">
+                                    <a:latin typeface="Cambria Math" panose="02040503050406030204" pitchFamily="18" charset="0"/>
+                                  </a:rPr>
+                                  <m:t>±0.</m:t>
+                                </m:r>
+                                <m:r>
+                                  <a:rPr lang="de-DE" b="0" i="1" smtClean="0">
+                                    <a:latin typeface="Cambria Math" panose="02040503050406030204" pitchFamily="18" charset="0"/>
+                                  </a:rPr>
+                                  <m:t>119</m:t>
+                                </m:r>
+                              </m:oMath>
+                            </m:oMathPara>
                           </a14:m>
-                          <a:r>
-                            <a:rPr lang="en-US"/>
-                            <a:t>3</a:t>
-                          </a:r>
+                          <a:endParaRPr lang="en-US"/>
                         </a:p>
                       </a:txBody>
                       <a:tcPr/>
@@ -18503,43 +18536,7 @@
                                   <a:rPr lang="de-DE" b="0" i="1" smtClean="0">
                                     <a:latin typeface="Cambria Math" panose="02040503050406030204" pitchFamily="18" charset="0"/>
                                   </a:rPr>
-                                  <m:t>42</m:t>
-                                </m:r>
-                                <m:r>
-                                  <a:rPr lang="de-DE" b="0" i="1" smtClean="0">
-                                    <a:latin typeface="Cambria Math" panose="02040503050406030204" pitchFamily="18" charset="0"/>
-                                  </a:rPr>
-                                  <m:t>.7</m:t>
-                                </m:r>
-                                <m:r>
-                                  <a:rPr lang="de-DE" b="0" i="1" smtClean="0">
-                                    <a:latin typeface="Cambria Math" panose="02040503050406030204" pitchFamily="18" charset="0"/>
-                                  </a:rPr>
-                                  <m:t>8</m:t>
-                                </m:r>
-                                <m:r>
-                                  <a:rPr lang="de-DE" b="0" i="1" smtClean="0">
-                                    <a:latin typeface="Cambria Math" panose="02040503050406030204" pitchFamily="18" charset="0"/>
-                                  </a:rPr>
-                                  <m:t>±</m:t>
-                                </m:r>
-                                <m:r>
-                                  <a:rPr lang="de-DE" b="0" i="1" smtClean="0">
-                                    <a:latin typeface="Cambria Math" panose="02040503050406030204" pitchFamily="18" charset="0"/>
-                                  </a:rPr>
-                                  <m:t>0</m:t>
-                                </m:r>
-                                <m:r>
-                                  <a:rPr lang="de-DE" b="0" i="1" smtClean="0">
-                                    <a:latin typeface="Cambria Math" panose="02040503050406030204" pitchFamily="18" charset="0"/>
-                                  </a:rPr>
-                                  <m:t>.</m:t>
-                                </m:r>
-                                <m:r>
-                                  <a:rPr lang="de-DE" b="0" i="1" smtClean="0">
-                                    <a:latin typeface="Cambria Math" panose="02040503050406030204" pitchFamily="18" charset="0"/>
-                                  </a:rPr>
-                                  <m:t>593</m:t>
+                                  <m:t>42.78±0.593</m:t>
                                 </m:r>
                               </m:oMath>
                             </m:oMathPara>
@@ -18581,7 +18578,7 @@
                                   <a:rPr lang="de-DE" b="0" i="1" smtClean="0">
                                     <a:latin typeface="Cambria Math" panose="02040503050406030204" pitchFamily="18" charset="0"/>
                                   </a:rPr>
-                                  <m:t>12</m:t>
+                                  <m:t>15</m:t>
                                 </m:r>
                                 <m:r>
                                   <a:rPr lang="de-DE" b="0" i="1" smtClean="0">
@@ -18593,7 +18590,7 @@
                                   <a:rPr lang="de-DE" b="0" i="1" smtClean="0">
                                     <a:latin typeface="Cambria Math" panose="02040503050406030204" pitchFamily="18" charset="0"/>
                                   </a:rPr>
-                                  <m:t>0</m:t>
+                                  <m:t>1</m:t>
                                 </m:r>
                               </m:oMath>
                             </m:oMathPara>
@@ -18635,7 +18632,25 @@
                                   <a:rPr lang="de-DE" b="0" i="1" smtClean="0">
                                     <a:latin typeface="Cambria Math" panose="02040503050406030204" pitchFamily="18" charset="0"/>
                                   </a:rPr>
-                                  <m:t>0.28±0.004</m:t>
+                                  <m:t>0.35</m:t>
+                                </m:r>
+                                <m:r>
+                                  <a:rPr lang="de-DE" b="0" i="1" smtClean="0">
+                                    <a:latin typeface="Cambria Math" panose="02040503050406030204" pitchFamily="18" charset="0"/>
+                                  </a:rPr>
+                                  <m:t>±0.0</m:t>
+                                </m:r>
+                                <m:r>
+                                  <a:rPr lang="de-DE" b="0" i="1" smtClean="0">
+                                    <a:latin typeface="Cambria Math" panose="02040503050406030204" pitchFamily="18" charset="0"/>
+                                  </a:rPr>
+                                  <m:t>2</m:t>
+                                </m:r>
+                                <m:r>
+                                  <a:rPr lang="de-DE" b="0" i="1" smtClean="0">
+                                    <a:latin typeface="Cambria Math" panose="02040503050406030204" pitchFamily="18" charset="0"/>
+                                  </a:rPr>
+                                  <m:t>4</m:t>
                                 </m:r>
                               </m:oMath>
                             </m:oMathPara>
@@ -18672,13 +18687,13 @@
               <p:nvPr>
                 <p:extLst>
                   <p:ext uri="{D42A27DB-BD31-4B8C-83A1-F6EECF244321}">
-                    <p14:modId xmlns:p14="http://schemas.microsoft.com/office/powerpoint/2010/main" val="1369428207"/>
+                    <p14:modId xmlns:p14="http://schemas.microsoft.com/office/powerpoint/2010/main" val="1765281165"/>
                   </p:ext>
                 </p:extLst>
               </p:nvPr>
             </p:nvGraphicFramePr>
             <p:xfrm>
-              <a:off x="68580" y="3408898"/>
+              <a:off x="60960" y="3380318"/>
               <a:ext cx="4907280" cy="1645582"/>
             </p:xfrm>
             <a:graphic>
@@ -18757,7 +18772,7 @@
                         <a:blipFill>
                           <a:blip r:embed="rId4"/>
                           <a:stretch>
-                            <a:fillRect l="-200000" t="-1695" r="-100000" b="-361017"/>
+                            <a:fillRect l="-200995" t="-1695" r="-100995" b="-361017"/>
                           </a:stretch>
                         </a:blipFill>
                       </a:tcPr>
@@ -18774,7 +18789,7 @@
                         <a:blipFill>
                           <a:blip r:embed="rId4"/>
                           <a:stretch>
-                            <a:fillRect l="-301493" t="-1695" r="-498" b="-361017"/>
+                            <a:fillRect l="-300995" t="-1695" r="-995" b="-361017"/>
                           </a:stretch>
                         </a:blipFill>
                       </a:tcPr>
@@ -18830,7 +18845,7 @@
                         <a:blipFill>
                           <a:blip r:embed="rId4"/>
                           <a:stretch>
-                            <a:fillRect l="-200000" t="-84507" r="-100000" b="-200000"/>
+                            <a:fillRect l="-200995" t="-84507" r="-100995" b="-200000"/>
                           </a:stretch>
                         </a:blipFill>
                       </a:tcPr>
@@ -18847,7 +18862,7 @@
                         <a:blipFill>
                           <a:blip r:embed="rId4"/>
                           <a:stretch>
-                            <a:fillRect l="-301493" t="-84507" r="-498" b="-200000"/>
+                            <a:fillRect l="-300995" t="-84507" r="-995" b="-200000"/>
                           </a:stretch>
                         </a:blipFill>
                       </a:tcPr>
@@ -18903,7 +18918,7 @@
                         <a:blipFill>
                           <a:blip r:embed="rId4"/>
                           <a:stretch>
-                            <a:fillRect l="-200000" t="-187143" r="-100000" b="-102857"/>
+                            <a:fillRect l="-200995" t="-187143" r="-100995" b="-102857"/>
                           </a:stretch>
                         </a:blipFill>
                       </a:tcPr>
@@ -18920,7 +18935,7 @@
                         <a:blipFill>
                           <a:blip r:embed="rId4"/>
                           <a:stretch>
-                            <a:fillRect l="-301493" t="-187143" r="-498" b="-102857"/>
+                            <a:fillRect l="-300995" t="-187143" r="-995" b="-102857"/>
                           </a:stretch>
                         </a:blipFill>
                       </a:tcPr>
@@ -18976,7 +18991,7 @@
                         <a:blipFill>
                           <a:blip r:embed="rId4"/>
                           <a:stretch>
-                            <a:fillRect l="-200000" t="-283099" r="-100000" b="-1408"/>
+                            <a:fillRect l="-200995" t="-283099" r="-100995" b="-1408"/>
                           </a:stretch>
                         </a:blipFill>
                       </a:tcPr>
@@ -18993,7 +19008,7 @@
                         <a:blipFill>
                           <a:blip r:embed="rId4"/>
                           <a:stretch>
-                            <a:fillRect l="-301493" t="-283099" r="-498" b="-1408"/>
+                            <a:fillRect l="-300995" t="-283099" r="-995" b="-1408"/>
                           </a:stretch>
                         </a:blipFill>
                       </a:tcPr>
@@ -19010,6 +19025,470 @@
           </p:graphicFrame>
         </mc:Fallback>
       </mc:AlternateContent>
+      <p:cxnSp>
+        <p:nvCxnSpPr>
+          <p:cNvPr id="2" name="Gerader Verbinder 1">
+            <a:extLst>
+              <a:ext uri="{FF2B5EF4-FFF2-40B4-BE49-F238E27FC236}">
+                <a16:creationId xmlns:a16="http://schemas.microsoft.com/office/drawing/2014/main" id="{882D78AF-4C4D-B5A5-C52A-83FA924BDB83}"/>
+              </a:ext>
+            </a:extLst>
+          </p:cNvPr>
+          <p:cNvCxnSpPr>
+            <a:cxnSpLocks/>
+          </p:cNvCxnSpPr>
+          <p:nvPr/>
+        </p:nvCxnSpPr>
+        <p:spPr>
+          <a:xfrm>
+            <a:off x="307342" y="2809481"/>
+            <a:ext cx="7363760" cy="0"/>
+          </a:xfrm>
+          <a:prstGeom prst="line">
+            <a:avLst/>
+          </a:prstGeom>
+        </p:spPr>
+        <p:style>
+          <a:lnRef idx="1">
+            <a:schemeClr val="accent1"/>
+          </a:lnRef>
+          <a:fillRef idx="0">
+            <a:schemeClr val="accent1"/>
+          </a:fillRef>
+          <a:effectRef idx="0">
+            <a:schemeClr val="accent1"/>
+          </a:effectRef>
+          <a:fontRef idx="minor">
+            <a:schemeClr val="tx1"/>
+          </a:fontRef>
+        </p:style>
+      </p:cxnSp>
+      <p:cxnSp>
+        <p:nvCxnSpPr>
+          <p:cNvPr id="7" name="Gerader Verbinder 6">
+            <a:extLst>
+              <a:ext uri="{FF2B5EF4-FFF2-40B4-BE49-F238E27FC236}">
+                <a16:creationId xmlns:a16="http://schemas.microsoft.com/office/drawing/2014/main" id="{DE571B8C-728C-E207-5546-37D4728144DA}"/>
+              </a:ext>
+            </a:extLst>
+          </p:cNvPr>
+          <p:cNvCxnSpPr>
+            <a:cxnSpLocks/>
+          </p:cNvCxnSpPr>
+          <p:nvPr/>
+        </p:nvCxnSpPr>
+        <p:spPr>
+          <a:xfrm>
+            <a:off x="792956" y="2499519"/>
+            <a:ext cx="0" cy="592931"/>
+          </a:xfrm>
+          <a:prstGeom prst="line">
+            <a:avLst/>
+          </a:prstGeom>
+        </p:spPr>
+        <p:style>
+          <a:lnRef idx="1">
+            <a:schemeClr val="accent1"/>
+          </a:lnRef>
+          <a:fillRef idx="0">
+            <a:schemeClr val="accent1"/>
+          </a:fillRef>
+          <a:effectRef idx="0">
+            <a:schemeClr val="accent1"/>
+          </a:effectRef>
+          <a:fontRef idx="minor">
+            <a:schemeClr val="tx1"/>
+          </a:fontRef>
+        </p:style>
+      </p:cxnSp>
+      <mc:AlternateContent xmlns:mc="http://schemas.openxmlformats.org/markup-compatibility/2006">
+        <mc:Choice xmlns:a14="http://schemas.microsoft.com/office/drawing/2010/main" Requires="a14">
+          <p:sp>
+            <p:nvSpPr>
+              <p:cNvPr id="8" name="Textfeld 7">
+                <a:extLst>
+                  <a:ext uri="{FF2B5EF4-FFF2-40B4-BE49-F238E27FC236}">
+                    <a16:creationId xmlns:a16="http://schemas.microsoft.com/office/drawing/2014/main" id="{F230F4C1-2BE4-B437-C936-E979E753C196}"/>
+                  </a:ext>
+                </a:extLst>
+              </p:cNvPr>
+              <p:cNvSpPr txBox="1"/>
+              <p:nvPr/>
+            </p:nvSpPr>
+            <p:spPr>
+              <a:xfrm>
+                <a:off x="1008080" y="2480838"/>
+                <a:ext cx="1644948" cy="266163"/>
+              </a:xfrm>
+              <a:prstGeom prst="rect">
+                <a:avLst/>
+              </a:prstGeom>
+              <a:noFill/>
+            </p:spPr>
+            <p:txBody>
+              <a:bodyPr wrap="square">
+                <a:spAutoFit/>
+              </a:bodyPr>
+              <a:lstStyle/>
+              <a:p>
+                <a:pPr/>
+                <a14:m>
+                  <m:oMathPara xmlns:m="http://schemas.openxmlformats.org/officeDocument/2006/math">
+                    <m:oMathParaPr>
+                      <m:jc m:val="centerGroup"/>
+                    </m:oMathParaPr>
+                    <m:oMath xmlns:m="http://schemas.openxmlformats.org/officeDocument/2006/math">
+                      <m:sSubSup>
+                        <m:sSubSupPr>
+                          <m:ctrlPr>
+                            <a:rPr lang="de-DE" sz="1100" b="0" i="1" smtClean="0">
+                              <a:latin typeface="Cambria Math" panose="02040503050406030204" pitchFamily="18" charset="0"/>
+                            </a:rPr>
+                          </m:ctrlPr>
+                        </m:sSubSupPr>
+                        <m:e>
+                          <m:r>
+                            <a:rPr lang="de-DE" sz="1100" b="0" i="1" smtClean="0">
+                              <a:latin typeface="Cambria Math" panose="02040503050406030204" pitchFamily="18" charset="0"/>
+                            </a:rPr>
+                            <m:t>𝐼</m:t>
+                          </m:r>
+                        </m:e>
+                        <m:sub>
+                          <m:r>
+                            <m:rPr>
+                              <m:sty m:val="p"/>
+                            </m:rPr>
+                            <a:rPr lang="de-DE" sz="1100" b="0" i="0" smtClean="0">
+                              <a:latin typeface="Cambria Math" panose="02040503050406030204" pitchFamily="18" charset="0"/>
+                            </a:rPr>
+                            <m:t>MIP</m:t>
+                          </m:r>
+                        </m:sub>
+                        <m:sup>
+                          <m:r>
+                            <m:rPr>
+                              <m:sty m:val="p"/>
+                            </m:rPr>
+                            <a:rPr lang="de-DE" sz="1100" b="0" i="0" smtClean="0">
+                              <a:latin typeface="Cambria Math" panose="02040503050406030204" pitchFamily="18" charset="0"/>
+                            </a:rPr>
+                            <m:t>est</m:t>
+                          </m:r>
+                          <m:r>
+                            <a:rPr lang="de-DE" sz="1100" b="0" i="1" smtClean="0">
+                              <a:latin typeface="Cambria Math" panose="02040503050406030204" pitchFamily="18" charset="0"/>
+                            </a:rPr>
+                            <m:t>.</m:t>
+                          </m:r>
+                        </m:sup>
+                      </m:sSubSup>
+                      <m:r>
+                        <a:rPr lang="de-DE" sz="1100" b="0" i="1" smtClean="0">
+                          <a:latin typeface="Cambria Math" panose="02040503050406030204" pitchFamily="18" charset="0"/>
+                        </a:rPr>
+                        <m:t>=</m:t>
+                      </m:r>
+                      <m:d>
+                        <m:dPr>
+                          <m:ctrlPr>
+                            <a:rPr lang="de-DE" sz="1100" b="0" i="1" smtClean="0">
+                              <a:latin typeface="Cambria Math" panose="02040503050406030204" pitchFamily="18" charset="0"/>
+                            </a:rPr>
+                          </m:ctrlPr>
+                        </m:dPr>
+                        <m:e>
+                          <m:r>
+                            <a:rPr lang="de-DE" sz="1100" b="0" i="1" smtClean="0">
+                              <a:latin typeface="Cambria Math" panose="02040503050406030204" pitchFamily="18" charset="0"/>
+                            </a:rPr>
+                            <m:t>1</m:t>
+                          </m:r>
+                          <m:r>
+                            <a:rPr lang="de-DE" sz="1100" b="0" i="1" smtClean="0">
+                              <a:latin typeface="Cambria Math" panose="02040503050406030204" pitchFamily="18" charset="0"/>
+                            </a:rPr>
+                            <m:t>5±1</m:t>
+                          </m:r>
+                        </m:e>
+                      </m:d>
+                      <m:r>
+                        <a:rPr lang="de-DE" sz="1100" b="0" i="0" smtClean="0">
+                          <a:latin typeface="Cambria Math" panose="02040503050406030204" pitchFamily="18" charset="0"/>
+                        </a:rPr>
+                        <m:t> </m:t>
+                      </m:r>
+                      <m:r>
+                        <m:rPr>
+                          <m:sty m:val="p"/>
+                        </m:rPr>
+                        <a:rPr lang="de-DE" sz="1100" b="0" i="0" smtClean="0">
+                          <a:latin typeface="Cambria Math" panose="02040503050406030204" pitchFamily="18" charset="0"/>
+                        </a:rPr>
+                        <m:t>ADC</m:t>
+                      </m:r>
+                    </m:oMath>
+                  </m:oMathPara>
+                </a14:m>
+                <a:endParaRPr lang="en-US"/>
+              </a:p>
+            </p:txBody>
+          </p:sp>
+        </mc:Choice>
+        <mc:Fallback>
+          <p:sp>
+            <p:nvSpPr>
+              <p:cNvPr id="8" name="Textfeld 7">
+                <a:extLst>
+                  <a:ext uri="{FF2B5EF4-FFF2-40B4-BE49-F238E27FC236}">
+                    <a16:creationId xmlns:a16="http://schemas.microsoft.com/office/drawing/2014/main" id="{F230F4C1-2BE4-B437-C936-E979E753C196}"/>
+                  </a:ext>
+                </a:extLst>
+              </p:cNvPr>
+              <p:cNvSpPr txBox="1">
+                <a:spLocks noRot="1" noChangeAspect="1" noMove="1" noResize="1" noEditPoints="1" noAdjustHandles="1" noChangeArrowheads="1" noChangeShapeType="1" noTextEdit="1"/>
+              </p:cNvSpPr>
+              <p:nvPr/>
+            </p:nvSpPr>
+            <p:spPr>
+              <a:xfrm>
+                <a:off x="1008080" y="2480838"/>
+                <a:ext cx="1644948" cy="266163"/>
+              </a:xfrm>
+              <a:prstGeom prst="rect">
+                <a:avLst/>
+              </a:prstGeom>
+              <a:blipFill>
+                <a:blip r:embed="rId5"/>
+                <a:stretch>
+                  <a:fillRect/>
+                </a:stretch>
+              </a:blipFill>
+            </p:spPr>
+            <p:txBody>
+              <a:bodyPr/>
+              <a:lstStyle/>
+              <a:p>
+                <a:r>
+                  <a:rPr lang="en-US">
+                    <a:noFill/>
+                  </a:rPr>
+                  <a:t> </a:t>
+                </a:r>
+              </a:p>
+            </p:txBody>
+          </p:sp>
+        </mc:Fallback>
+      </mc:AlternateContent>
+      <p:sp>
+        <p:nvSpPr>
+          <p:cNvPr id="9" name="Pfeil: nach rechts 8">
+            <a:extLst>
+              <a:ext uri="{FF2B5EF4-FFF2-40B4-BE49-F238E27FC236}">
+                <a16:creationId xmlns:a16="http://schemas.microsoft.com/office/drawing/2014/main" id="{68881FBE-8F7E-B914-9905-EFB7B97D9E12}"/>
+              </a:ext>
+            </a:extLst>
+          </p:cNvPr>
+          <p:cNvSpPr/>
+          <p:nvPr/>
+        </p:nvSpPr>
+        <p:spPr>
+          <a:xfrm rot="10800000">
+            <a:off x="878366" y="2591744"/>
+            <a:ext cx="212599" cy="86245"/>
+          </a:xfrm>
+          <a:prstGeom prst="rightArrow">
+            <a:avLst/>
+          </a:prstGeom>
+        </p:spPr>
+        <p:style>
+          <a:lnRef idx="2">
+            <a:schemeClr val="accent1">
+              <a:shade val="15000"/>
+            </a:schemeClr>
+          </a:lnRef>
+          <a:fillRef idx="1">
+            <a:schemeClr val="accent1"/>
+          </a:fillRef>
+          <a:effectRef idx="0">
+            <a:schemeClr val="accent1"/>
+          </a:effectRef>
+          <a:fontRef idx="minor">
+            <a:schemeClr val="lt1"/>
+          </a:fontRef>
+        </p:style>
+        <p:txBody>
+          <a:bodyPr rtlCol="0" anchor="ctr"/>
+          <a:lstStyle/>
+          <a:p>
+            <a:pPr algn="ctr"/>
+            <a:endParaRPr lang="en-US"/>
+          </a:p>
+        </p:txBody>
+      </p:sp>
+      <mc:AlternateContent xmlns:mc="http://schemas.openxmlformats.org/markup-compatibility/2006">
+        <mc:Choice xmlns:a14="http://schemas.microsoft.com/office/drawing/2010/main" Requires="a14">
+          <p:sp>
+            <p:nvSpPr>
+              <p:cNvPr id="12" name="Textfeld 11">
+                <a:extLst>
+                  <a:ext uri="{FF2B5EF4-FFF2-40B4-BE49-F238E27FC236}">
+                    <a16:creationId xmlns:a16="http://schemas.microsoft.com/office/drawing/2014/main" id="{4FD0893A-BA7D-6147-7792-27D18C2F64F1}"/>
+                  </a:ext>
+                </a:extLst>
+              </p:cNvPr>
+              <p:cNvSpPr txBox="1"/>
+              <p:nvPr/>
+            </p:nvSpPr>
+            <p:spPr>
+              <a:xfrm>
+                <a:off x="6496664" y="2612691"/>
+                <a:ext cx="423193" cy="184666"/>
+              </a:xfrm>
+              <a:prstGeom prst="rect">
+                <a:avLst/>
+              </a:prstGeom>
+              <a:noFill/>
+            </p:spPr>
+            <p:txBody>
+              <a:bodyPr wrap="none" lIns="0" tIns="0" rIns="0" bIns="0" rtlCol="0">
+                <a:spAutoFit/>
+              </a:bodyPr>
+              <a:lstStyle/>
+              <a:p>
+                <a:pPr/>
+                <a14:m>
+                  <m:oMathPara xmlns:m="http://schemas.openxmlformats.org/officeDocument/2006/math">
+                    <m:oMathParaPr>
+                      <m:jc m:val="centerGroup"/>
+                    </m:oMathParaPr>
+                    <m:oMath xmlns:m="http://schemas.openxmlformats.org/officeDocument/2006/math">
+                      <m:r>
+                        <a:rPr lang="de-DE" sz="1200">
+                          <a:latin typeface="Cambria Math" panose="02040503050406030204" pitchFamily="18" charset="0"/>
+                        </a:rPr>
+                        <m:t>2</m:t>
+                      </m:r>
+                      <m:r>
+                        <a:rPr lang="de-DE" sz="1200" b="0" i="0" smtClean="0">
+                          <a:latin typeface="Cambria Math" panose="02040503050406030204" pitchFamily="18" charset="0"/>
+                        </a:rPr>
+                        <m:t>0 </m:t>
+                      </m:r>
+                      <m:r>
+                        <m:rPr>
+                          <m:sty m:val="p"/>
+                        </m:rPr>
+                        <a:rPr lang="de-DE" sz="1200" b="0" i="0" smtClean="0">
+                          <a:latin typeface="Cambria Math" panose="02040503050406030204" pitchFamily="18" charset="0"/>
+                        </a:rPr>
+                        <m:t>Hz</m:t>
+                      </m:r>
+                    </m:oMath>
+                  </m:oMathPara>
+                </a14:m>
+                <a:endParaRPr lang="en-US" sz="1200"/>
+              </a:p>
+            </p:txBody>
+          </p:sp>
+        </mc:Choice>
+        <mc:Fallback>
+          <p:sp>
+            <p:nvSpPr>
+              <p:cNvPr id="12" name="Textfeld 11">
+                <a:extLst>
+                  <a:ext uri="{FF2B5EF4-FFF2-40B4-BE49-F238E27FC236}">
+                    <a16:creationId xmlns:a16="http://schemas.microsoft.com/office/drawing/2014/main" id="{4FD0893A-BA7D-6147-7792-27D18C2F64F1}"/>
+                  </a:ext>
+                </a:extLst>
+              </p:cNvPr>
+              <p:cNvSpPr txBox="1">
+                <a:spLocks noRot="1" noChangeAspect="1" noMove="1" noResize="1" noEditPoints="1" noAdjustHandles="1" noChangeArrowheads="1" noChangeShapeType="1" noTextEdit="1"/>
+              </p:cNvSpPr>
+              <p:nvPr/>
+            </p:nvSpPr>
+            <p:spPr>
+              <a:xfrm>
+                <a:off x="6496664" y="2612691"/>
+                <a:ext cx="423193" cy="184666"/>
+              </a:xfrm>
+              <a:prstGeom prst="rect">
+                <a:avLst/>
+              </a:prstGeom>
+              <a:blipFill>
+                <a:blip r:embed="rId6"/>
+                <a:stretch>
+                  <a:fillRect l="-7246" r="-8696" b="-10000"/>
+                </a:stretch>
+              </a:blipFill>
+            </p:spPr>
+            <p:txBody>
+              <a:bodyPr/>
+              <a:lstStyle/>
+              <a:p>
+                <a:r>
+                  <a:rPr lang="en-US">
+                    <a:noFill/>
+                  </a:rPr>
+                  <a:t> </a:t>
+                </a:r>
+              </a:p>
+            </p:txBody>
+          </p:sp>
+        </mc:Fallback>
+      </mc:AlternateContent>
+      <p:sp>
+        <p:nvSpPr>
+          <p:cNvPr id="13" name="Rechteck 12">
+            <a:extLst>
+              <a:ext uri="{FF2B5EF4-FFF2-40B4-BE49-F238E27FC236}">
+                <a16:creationId xmlns:a16="http://schemas.microsoft.com/office/drawing/2014/main" id="{43C948EA-56B3-A3E1-6BAB-452C10243399}"/>
+              </a:ext>
+            </a:extLst>
+          </p:cNvPr>
+          <p:cNvSpPr/>
+          <p:nvPr/>
+        </p:nvSpPr>
+        <p:spPr>
+          <a:xfrm>
+            <a:off x="3760580" y="3744646"/>
+            <a:ext cx="1186070" cy="1284434"/>
+          </a:xfrm>
+          <a:prstGeom prst="rect">
+            <a:avLst/>
+          </a:prstGeom>
+          <a:noFill/>
+          <a:ln w="38100">
+            <a:solidFill>
+              <a:srgbClr val="C00000"/>
+            </a:solidFill>
+          </a:ln>
+        </p:spPr>
+        <p:style>
+          <a:lnRef idx="2">
+            <a:schemeClr val="accent1">
+              <a:shade val="15000"/>
+            </a:schemeClr>
+          </a:lnRef>
+          <a:fillRef idx="1">
+            <a:schemeClr val="accent1"/>
+          </a:fillRef>
+          <a:effectRef idx="0">
+            <a:schemeClr val="accent1"/>
+          </a:effectRef>
+          <a:fontRef idx="minor">
+            <a:schemeClr val="lt1"/>
+          </a:fontRef>
+        </p:style>
+        <p:txBody>
+          <a:bodyPr rtlCol="0" anchor="ctr"/>
+          <a:lstStyle/>
+          <a:p>
+            <a:pPr algn="ctr"/>
+            <a:endParaRPr lang="en-US"/>
+          </a:p>
+        </p:txBody>
+      </p:sp>
     </p:spTree>
     <p:extLst>
       <p:ext uri="{BB962C8B-B14F-4D97-AF65-F5344CB8AC3E}">
@@ -19057,7 +19536,7 @@
           <a:p>
             <a:fld id="{0A9BFA6A-9A63-4E2D-92C0-C77BFA750EDB}" type="datetime1">
               <a:rPr lang="de-DE" noProof="0" smtClean="0"/>
-              <a:t>27.10.2023</a:t>
+              <a:t>28.10.2023</a:t>
             </a:fld>
             <a:endParaRPr lang="en-US" noProof="0"/>
           </a:p>
@@ -19103,7 +19582,7 @@
           <a:p>
             <a:r>
               <a:rPr lang="de-DE"/>
-              <a:t>Next steps</a:t>
+              <a:t>Summary &amp; Next steps</a:t>
             </a:r>
             <a:endParaRPr lang="de-DE" dirty="0"/>
           </a:p>
@@ -19141,35 +19620,21 @@
               <a:p>
                 <a:r>
                   <a:rPr lang="de-DE" sz="1600" b="0"/>
-                  <a:t>Calibration procedure (software level) reliant on T1 formation (FPGA level)</a:t>
-                </a:r>
-                <a:endParaRPr lang="de-DE" sz="1600"/>
-              </a:p>
-              <a:p>
-                <a:pPr lvl="1"/>
-                <a:r>
-                  <a:rPr lang="de-DE" sz="1400"/>
-                  <a:t>T1 trigger = all WCD PMTs above </a:t>
+                  <a:t>Rate based online estimate of </a:t>
                 </a:r>
                 <a14:m>
                   <m:oMath xmlns:m="http://schemas.openxmlformats.org/officeDocument/2006/math">
                     <m:sSubSup>
                       <m:sSubSupPr>
                         <m:ctrlPr>
-                          <a:rPr lang="de-DE" sz="1400" i="1" smtClean="0">
+                          <a:rPr lang="de-DE" sz="1600" b="0" i="1" smtClean="0">
                             <a:latin typeface="Cambria Math" panose="02040503050406030204" pitchFamily="18" charset="0"/>
                           </a:rPr>
                         </m:ctrlPr>
                       </m:sSubSupPr>
                       <m:e>
                         <m:r>
-                          <a:rPr lang="de-DE" sz="1400" b="0" i="1" smtClean="0">
-                            <a:latin typeface="Cambria Math" panose="02040503050406030204" pitchFamily="18" charset="0"/>
-                          </a:rPr>
-                          <m:t>1.75 </m:t>
-                        </m:r>
-                        <m:r>
-                          <a:rPr lang="de-DE" sz="1400" i="1">
+                          <a:rPr lang="de-DE" sz="1600" b="0" i="1" smtClean="0">
                             <a:latin typeface="Cambria Math" panose="02040503050406030204" pitchFamily="18" charset="0"/>
                           </a:rPr>
                           <m:t>𝐼</m:t>
@@ -19180,10 +19645,10 @@
                           <m:rPr>
                             <m:sty m:val="p"/>
                           </m:rPr>
-                          <a:rPr lang="de-DE" sz="1400" b="0" i="0" smtClean="0">
+                          <a:rPr lang="de-DE" sz="1600" b="0" i="0" smtClean="0">
                             <a:latin typeface="Cambria Math" panose="02040503050406030204" pitchFamily="18" charset="0"/>
                           </a:rPr>
-                          <m:t>VEM</m:t>
+                          <m:t>MIP</m:t>
                         </m:r>
                       </m:sub>
                       <m:sup>
@@ -19191,13 +19656,13 @@
                           <m:rPr>
                             <m:sty m:val="p"/>
                           </m:rPr>
-                          <a:rPr lang="de-DE" sz="1400">
+                          <a:rPr lang="de-DE" sz="1600" b="0" i="0" smtClean="0">
                             <a:latin typeface="Cambria Math" panose="02040503050406030204" pitchFamily="18" charset="0"/>
                           </a:rPr>
                           <m:t>est</m:t>
                         </m:r>
                         <m:r>
-                          <a:rPr lang="de-DE" sz="1400" i="1">
+                          <a:rPr lang="de-DE" sz="1600" b="0" i="0" smtClean="0">
                             <a:latin typeface="Cambria Math" panose="02040503050406030204" pitchFamily="18" charset="0"/>
                           </a:rPr>
                           <m:t>.</m:t>
@@ -19207,41 +19672,159 @@
                   </m:oMath>
                 </a14:m>
                 <a:r>
-                  <a:rPr lang="de-DE" sz="1400"/>
-                  <a:t> in same bin</a:t>
+                  <a:rPr lang="de-DE" sz="1600" b="0"/>
+                  <a:t> seems possible at first glance</a:t>
                 </a:r>
               </a:p>
               <a:p>
-                <a:pPr lvl="1"/>
-                <a:r>
-                  <a:rPr lang="de-DE" sz="1400"/>
-                  <a:t>Historical reasons</a:t>
-                </a:r>
-              </a:p>
-              <a:p>
-                <a:pPr marL="266771" lvl="1" indent="0">
+                <a:pPr marL="0" indent="0">
                   <a:buNone/>
                 </a:pPr>
-                <a:endParaRPr lang="de-DE" sz="1400"/>
+                <a:endParaRPr lang="de-DE" sz="200" b="0"/>
               </a:p>
               <a:p>
                 <a:r>
                   <a:rPr lang="de-DE" sz="1600"/>
-                  <a:t>Much easier to implement SSD online calibration algorithm with this in mind</a:t>
+                  <a:t>T1 preselection might complicate things, more data needed to say for sure</a:t>
                 </a:r>
               </a:p>
               <a:p>
-                <a:pPr lvl="1"/>
+                <a:pPr marL="0" indent="0">
+                  <a:buNone/>
+                </a:pPr>
+                <a:endParaRPr lang="de-DE" sz="1600" b="0"/>
+              </a:p>
+              <a:p>
+                <a:pPr marL="0" indent="0">
+                  <a:buNone/>
+                </a:pPr>
+                <a:endParaRPr lang="de-DE" sz="200"/>
+              </a:p>
+              <a:p>
                 <a:r>
-                  <a:rPr lang="de-DE" sz="1400"/>
-                  <a:t>Rerun analysis with T1 preselected SSD traces</a:t>
+                  <a:rPr lang="de-DE" sz="1600"/>
+                  <a:t>Check T3 data and compare UUBRandom histogram peak to offline reported </a:t>
+                </a:r>
+                <a14:m>
+                  <m:oMath xmlns:m="http://schemas.openxmlformats.org/officeDocument/2006/math">
+                    <m:sSubSup>
+                      <m:sSubSupPr>
+                        <m:ctrlPr>
+                          <a:rPr lang="de-DE" sz="1600" b="0" i="1" smtClean="0">
+                            <a:latin typeface="Cambria Math" panose="02040503050406030204" pitchFamily="18" charset="0"/>
+                          </a:rPr>
+                        </m:ctrlPr>
+                      </m:sSubSupPr>
+                      <m:e>
+                        <m:r>
+                          <a:rPr lang="de-DE" sz="1600" b="0" i="1" smtClean="0">
+                            <a:latin typeface="Cambria Math" panose="02040503050406030204" pitchFamily="18" charset="0"/>
+                          </a:rPr>
+                          <m:t>𝐼</m:t>
+                        </m:r>
+                      </m:e>
+                      <m:sub>
+                        <m:r>
+                          <m:rPr>
+                            <m:sty m:val="p"/>
+                          </m:rPr>
+                          <a:rPr lang="de-DE" sz="1600" b="0" i="0" smtClean="0">
+                            <a:latin typeface="Cambria Math" panose="02040503050406030204" pitchFamily="18" charset="0"/>
+                          </a:rPr>
+                          <m:t>MIP</m:t>
+                        </m:r>
+                      </m:sub>
+                      <m:sup>
+                        <m:r>
+                          <m:rPr>
+                            <m:sty m:val="p"/>
+                          </m:rPr>
+                          <a:rPr lang="de-DE" sz="1600" b="0" i="0" smtClean="0">
+                            <a:latin typeface="Cambria Math" panose="02040503050406030204" pitchFamily="18" charset="0"/>
+                          </a:rPr>
+                          <m:t>peak</m:t>
+                        </m:r>
+                      </m:sup>
+                    </m:sSubSup>
+                  </m:oMath>
+                </a14:m>
+                <a:endParaRPr lang="de-DE" sz="1600"/>
+              </a:p>
+              <a:p>
+                <a:pPr marL="0" indent="0">
+                  <a:buNone/>
+                </a:pPr>
+                <a:endParaRPr lang="de-DE" sz="200"/>
+              </a:p>
+              <a:p>
+                <a:r>
+                  <a:rPr lang="de-DE" sz="1600"/>
+                  <a:t>Quantify bias, std and error on </a:t>
+                </a:r>
+                <a14:m>
+                  <m:oMath xmlns:m="http://schemas.openxmlformats.org/officeDocument/2006/math">
+                    <m:sSubSup>
+                      <m:sSubSupPr>
+                        <m:ctrlPr>
+                          <a:rPr lang="de-DE" sz="1600" b="0" i="1" smtClean="0">
+                            <a:latin typeface="Cambria Math" panose="02040503050406030204" pitchFamily="18" charset="0"/>
+                          </a:rPr>
+                        </m:ctrlPr>
+                      </m:sSubSupPr>
+                      <m:e>
+                        <m:r>
+                          <a:rPr lang="de-DE" sz="1600" b="0" i="1" smtClean="0">
+                            <a:latin typeface="Cambria Math" panose="02040503050406030204" pitchFamily="18" charset="0"/>
+                          </a:rPr>
+                          <m:t>𝐼</m:t>
+                        </m:r>
+                      </m:e>
+                      <m:sub>
+                        <m:r>
+                          <m:rPr>
+                            <m:sty m:val="p"/>
+                          </m:rPr>
+                          <a:rPr lang="de-DE" sz="1600" b="0" i="0" smtClean="0">
+                            <a:latin typeface="Cambria Math" panose="02040503050406030204" pitchFamily="18" charset="0"/>
+                          </a:rPr>
+                          <m:t>MIP</m:t>
+                        </m:r>
+                      </m:sub>
+                      <m:sup>
+                        <m:r>
+                          <m:rPr>
+                            <m:sty m:val="p"/>
+                          </m:rPr>
+                          <a:rPr lang="de-DE" sz="1600" b="0" i="0" smtClean="0">
+                            <a:latin typeface="Cambria Math" panose="02040503050406030204" pitchFamily="18" charset="0"/>
+                          </a:rPr>
+                          <m:t>est</m:t>
+                        </m:r>
+                        <m:r>
+                          <a:rPr lang="de-DE" sz="1600" b="0" i="0" smtClean="0">
+                            <a:latin typeface="Cambria Math" panose="02040503050406030204" pitchFamily="18" charset="0"/>
+                          </a:rPr>
+                          <m:t>.</m:t>
+                        </m:r>
+                      </m:sup>
+                    </m:sSubSup>
+                  </m:oMath>
+                </a14:m>
+                <a:r>
+                  <a:rPr lang="de-DE" sz="1600"/>
+                  <a:t> for various target rates, ideally with special dataset</a:t>
                 </a:r>
               </a:p>
               <a:p>
-                <a:pPr lvl="1"/>
+                <a:pPr marL="0" indent="0">
+                  <a:buNone/>
+                </a:pPr>
+                <a:endParaRPr lang="de-DE" sz="200"/>
+              </a:p>
+              <a:p>
                 <a:r>
-                  <a:rPr lang="de-DE" sz="1400"/>
-                  <a:t>Results agree, but rates are lower        worse statistics!</a:t>
+                  <a:rPr lang="de-DE" sz="1600"/>
+                  <a:t>Your ideas</a:t>
                 </a:r>
                 <a:endParaRPr lang="de-DE" sz="1400" dirty="0"/>
               </a:p>
@@ -19273,7 +19856,7 @@
               <a:blipFill>
                 <a:blip r:embed="rId2"/>
                 <a:stretch>
-                  <a:fillRect t="-2574"/>
+                  <a:fillRect t="-2390"/>
                 </a:stretch>
               </a:blipFill>
             </p:spPr>
@@ -19292,52 +19875,6 @@
           </p:sp>
         </mc:Fallback>
       </mc:AlternateContent>
-      <p:sp>
-        <p:nvSpPr>
-          <p:cNvPr id="9" name="Pfeil: nach rechts 8">
-            <a:extLst>
-              <a:ext uri="{FF2B5EF4-FFF2-40B4-BE49-F238E27FC236}">
-                <a16:creationId xmlns:a16="http://schemas.microsoft.com/office/drawing/2014/main" id="{16EDB6CB-260F-B3CC-3E66-A17F22E40771}"/>
-              </a:ext>
-            </a:extLst>
-          </p:cNvPr>
-          <p:cNvSpPr/>
-          <p:nvPr/>
-        </p:nvSpPr>
-        <p:spPr>
-          <a:xfrm>
-            <a:off x="3423744" y="2988936"/>
-            <a:ext cx="239636" cy="81981"/>
-          </a:xfrm>
-          <a:prstGeom prst="rightArrow">
-            <a:avLst/>
-          </a:prstGeom>
-        </p:spPr>
-        <p:style>
-          <a:lnRef idx="2">
-            <a:schemeClr val="accent1">
-              <a:shade val="15000"/>
-            </a:schemeClr>
-          </a:lnRef>
-          <a:fillRef idx="1">
-            <a:schemeClr val="accent1"/>
-          </a:fillRef>
-          <a:effectRef idx="0">
-            <a:schemeClr val="accent1"/>
-          </a:effectRef>
-          <a:fontRef idx="minor">
-            <a:schemeClr val="lt1"/>
-          </a:fontRef>
-        </p:style>
-        <p:txBody>
-          <a:bodyPr rtlCol="0" anchor="ctr"/>
-          <a:lstStyle/>
-          <a:p>
-            <a:pPr algn="ctr"/>
-            <a:endParaRPr lang="en-US"/>
-          </a:p>
-        </p:txBody>
-      </p:sp>
     </p:spTree>
     <p:extLst>
       <p:ext uri="{BB962C8B-B14F-4D97-AF65-F5344CB8AC3E}">

</xml_diff>